<commit_message>
corectat greseli in ppt
</commit_message>
<xml_diff>
--- a/Documentatie/Documentație_ PPT.pptx
+++ b/Documentatie/Documentație_ PPT.pptx
@@ -261,7 +261,7 @@
           <a:p>
             <a:fld id="{842CD987-D5F0-423A-B571-656612AAA3E1}" type="datetimeFigureOut">
               <a:rPr lang="en-US" smtClean="0"/>
-              <a:t>1/14/2023</a:t>
+              <a:t>1/23/2023</a:t>
             </a:fld>
             <a:endParaRPr lang="en-US"/>
           </a:p>
@@ -424,7 +424,7 @@
           <a:p>
             <a:fld id="{842CD987-D5F0-423A-B571-656612AAA3E1}" type="datetimeFigureOut">
               <a:rPr lang="en-US" smtClean="0"/>
-              <a:t>1/14/2023</a:t>
+              <a:t>1/23/2023</a:t>
             </a:fld>
             <a:endParaRPr lang="en-US"/>
           </a:p>
@@ -597,7 +597,7 @@
           <a:p>
             <a:fld id="{842CD987-D5F0-423A-B571-656612AAA3E1}" type="datetimeFigureOut">
               <a:rPr lang="en-US" smtClean="0"/>
-              <a:t>1/14/2023</a:t>
+              <a:t>1/23/2023</a:t>
             </a:fld>
             <a:endParaRPr lang="en-US"/>
           </a:p>
@@ -760,7 +760,7 @@
           <a:p>
             <a:fld id="{842CD987-D5F0-423A-B571-656612AAA3E1}" type="datetimeFigureOut">
               <a:rPr lang="en-US" smtClean="0"/>
-              <a:t>1/14/2023</a:t>
+              <a:t>1/23/2023</a:t>
             </a:fld>
             <a:endParaRPr lang="en-US"/>
           </a:p>
@@ -1000,7 +1000,7 @@
           <a:p>
             <a:fld id="{842CD987-D5F0-423A-B571-656612AAA3E1}" type="datetimeFigureOut">
               <a:rPr lang="en-US" smtClean="0"/>
-              <a:t>1/14/2023</a:t>
+              <a:t>1/23/2023</a:t>
             </a:fld>
             <a:endParaRPr lang="en-US"/>
           </a:p>
@@ -1224,7 +1224,7 @@
           <a:p>
             <a:fld id="{842CD987-D5F0-423A-B571-656612AAA3E1}" type="datetimeFigureOut">
               <a:rPr lang="en-US" smtClean="0"/>
-              <a:t>1/14/2023</a:t>
+              <a:t>1/23/2023</a:t>
             </a:fld>
             <a:endParaRPr lang="en-US"/>
           </a:p>
@@ -1583,7 +1583,7 @@
           <a:p>
             <a:fld id="{842CD987-D5F0-423A-B571-656612AAA3E1}" type="datetimeFigureOut">
               <a:rPr lang="en-US" smtClean="0"/>
-              <a:t>1/14/2023</a:t>
+              <a:t>1/23/2023</a:t>
             </a:fld>
             <a:endParaRPr lang="en-US"/>
           </a:p>
@@ -1695,7 +1695,7 @@
           <a:p>
             <a:fld id="{842CD987-D5F0-423A-B571-656612AAA3E1}" type="datetimeFigureOut">
               <a:rPr lang="en-US" smtClean="0"/>
-              <a:t>1/14/2023</a:t>
+              <a:t>1/23/2023</a:t>
             </a:fld>
             <a:endParaRPr lang="en-US"/>
           </a:p>
@@ -1785,7 +1785,7 @@
           <a:p>
             <a:fld id="{842CD987-D5F0-423A-B571-656612AAA3E1}" type="datetimeFigureOut">
               <a:rPr lang="en-US" smtClean="0"/>
-              <a:t>1/14/2023</a:t>
+              <a:t>1/23/2023</a:t>
             </a:fld>
             <a:endParaRPr lang="en-US"/>
           </a:p>
@@ -2055,7 +2055,7 @@
           <a:p>
             <a:fld id="{842CD987-D5F0-423A-B571-656612AAA3E1}" type="datetimeFigureOut">
               <a:rPr lang="en-US" smtClean="0"/>
-              <a:t>1/14/2023</a:t>
+              <a:t>1/23/2023</a:t>
             </a:fld>
             <a:endParaRPr lang="en-US"/>
           </a:p>
@@ -2302,7 +2302,7 @@
           <a:p>
             <a:fld id="{842CD987-D5F0-423A-B571-656612AAA3E1}" type="datetimeFigureOut">
               <a:rPr lang="en-US" smtClean="0"/>
-              <a:t>1/14/2023</a:t>
+              <a:t>1/23/2023</a:t>
             </a:fld>
             <a:endParaRPr lang="en-US"/>
           </a:p>
@@ -2513,7 +2513,7 @@
           <a:p>
             <a:fld id="{842CD987-D5F0-423A-B571-656612AAA3E1}" type="datetimeFigureOut">
               <a:rPr lang="en-US" smtClean="0"/>
-              <a:t>1/14/2023</a:t>
+              <a:t>1/23/2023</a:t>
             </a:fld>
             <a:endParaRPr lang="en-US"/>
           </a:p>
@@ -3740,10 +3740,16 @@
           <a:lstStyle/>
           <a:p>
             <a:r>
-              <a:rPr lang="en-US" sz="4400" dirty="0" err="1">
+              <a:rPr lang="en-US" sz="4400" dirty="0">
                 <a:latin typeface="UT Sans Bold" pitchFamily="50" charset="0"/>
               </a:rPr>
-              <a:t>TeaPython</a:t>
+              <a:t>Tea</a:t>
+            </a:r>
+            <a:r>
+              <a:rPr lang="ro-RO" sz="4400" dirty="0">
+                <a:latin typeface="UT Sans Bold" pitchFamily="50" charset="0"/>
+              </a:rPr>
+              <a:t>Web</a:t>
             </a:r>
             <a:endParaRPr lang="en-US" sz="4400" dirty="0">
               <a:latin typeface="UT Sans Bold" pitchFamily="50" charset="0"/>
@@ -4085,13 +4091,12 @@
               </a:spcAft>
             </a:pPr>
             <a:r>
-              <a:rPr lang="en-US" sz="3600" i="1" dirty="0" err="1">
-                <a:effectLst/>
-                <a:latin typeface="UT Sans"/>
-                <a:ea typeface="Times New Roman" panose="02020603050405020304" pitchFamily="18" charset="0"/>
-                <a:cs typeface="Calibri" panose="020F0502020204030204" pitchFamily="34" charset="0"/>
-              </a:rPr>
-              <a:t>Instalare</a:t>
+              <a:rPr lang="ro-RO" sz="3600" i="1" dirty="0">
+                <a:latin typeface="Calibri" panose="020F0502020204030204" pitchFamily="34" charset="0"/>
+                <a:ea typeface="Calibri" panose="020F0502020204030204" pitchFamily="34" charset="0"/>
+                <a:cs typeface="Calibri" panose="020F0502020204030204" pitchFamily="34" charset="0"/>
+              </a:rPr>
+              <a:t>Configurare aplicație</a:t>
             </a:r>
             <a:endParaRPr lang="en-US" sz="3600" i="1" dirty="0">
               <a:effectLst/>
@@ -4675,16 +4680,15 @@
                 <a:ea typeface="Calibri" panose="020F0502020204030204" pitchFamily="34" charset="0"/>
                 <a:cs typeface="Calibri" panose="020F0502020204030204" pitchFamily="34" charset="0"/>
               </a:rPr>
-              <a:t>” cu </a:t>
-            </a:r>
-            <a:r>
-              <a:rPr lang="en-US" sz="1400" dirty="0" err="1">
-                <a:effectLst/>
-                <a:latin typeface="UT Sans"/>
-                <a:ea typeface="Calibri" panose="020F0502020204030204" pitchFamily="34" charset="0"/>
-                <a:cs typeface="Calibri" panose="020F0502020204030204" pitchFamily="34" charset="0"/>
-              </a:rPr>
-              <a:t>pricina</a:t>
+              <a:t>” </a:t>
+            </a:r>
+            <a:r>
+              <a:rPr lang="ro-RO" sz="1400" dirty="0">
+                <a:latin typeface="UT Sans"/>
+                <a:ea typeface="Calibri" panose="020F0502020204030204" pitchFamily="34" charset="0"/>
+                <a:cs typeface="Calibri" panose="020F0502020204030204" pitchFamily="34" charset="0"/>
+              </a:rPr>
+              <a:t>,</a:t>
             </a:r>
             <a:r>
               <a:rPr lang="en-US" sz="1400" dirty="0">
@@ -5235,13 +5239,22 @@
               </a:buBlip>
             </a:pPr>
             <a:r>
-              <a:rPr lang="en-GB" sz="2000" dirty="0" err="1">
-                <a:effectLst/>
-                <a:latin typeface="UT Sans"/>
-                <a:ea typeface="Calibri" panose="020F0502020204030204" pitchFamily="34" charset="0"/>
-                <a:cs typeface="Times New Roman" panose="02020603050405020304" pitchFamily="18" charset="0"/>
-              </a:rPr>
-              <a:t>TeaPython</a:t>
+              <a:rPr lang="en-GB" sz="2000" dirty="0">
+                <a:effectLst/>
+                <a:latin typeface="UT Sans"/>
+                <a:ea typeface="Calibri" panose="020F0502020204030204" pitchFamily="34" charset="0"/>
+                <a:cs typeface="Times New Roman" panose="02020603050405020304" pitchFamily="18" charset="0"/>
+              </a:rPr>
+              <a:t>Tea</a:t>
+            </a:r>
+            <a:r>
+              <a:rPr lang="ro-RO" sz="2000" dirty="0">
+                <a:effectLst/>
+                <a:latin typeface="UT Sans"/>
+                <a:ea typeface="Calibri" panose="020F0502020204030204" pitchFamily="34" charset="0"/>
+                <a:cs typeface="Times New Roman" panose="02020603050405020304" pitchFamily="18" charset="0"/>
+              </a:rPr>
+              <a:t>Web</a:t>
             </a:r>
             <a:r>
               <a:rPr lang="en-GB" sz="2000" dirty="0">
@@ -6316,8 +6329,8 @@
         </p:blipFill>
         <p:spPr>
           <a:xfrm>
-            <a:off x="1934718" y="3159398"/>
-            <a:ext cx="5202555" cy="2541905"/>
+            <a:off x="1021519" y="2648013"/>
+            <a:ext cx="7100961" cy="3469443"/>
           </a:xfrm>
           <a:prstGeom prst="rect">
             <a:avLst/>
@@ -6811,8 +6824,8 @@
         </p:blipFill>
         <p:spPr bwMode="auto">
           <a:xfrm>
-            <a:off x="1948688" y="3169348"/>
-            <a:ext cx="5174615" cy="2581275"/>
+            <a:off x="1217550" y="2890684"/>
+            <a:ext cx="6774829" cy="3346628"/>
           </a:xfrm>
           <a:prstGeom prst="rect">
             <a:avLst/>
@@ -8867,8 +8880,8 @@
         </p:blipFill>
         <p:spPr bwMode="auto">
           <a:xfrm>
-            <a:off x="860298" y="2850823"/>
-            <a:ext cx="7351395" cy="3117850"/>
+            <a:off x="713241" y="2647757"/>
+            <a:ext cx="7816859" cy="3315261"/>
           </a:xfrm>
           <a:prstGeom prst="rect">
             <a:avLst/>
@@ -10921,7 +10934,25 @@
                 <a:ea typeface="Calibri" panose="020F0502020204030204" pitchFamily="34" charset="0"/>
                 <a:cs typeface="Times New Roman" panose="02020603050405020304" pitchFamily="18" charset="0"/>
               </a:rPr>
-              <a:t>droit</a:t>
+              <a:t>d</a:t>
+            </a:r>
+            <a:r>
+              <a:rPr lang="ro-RO" sz="2000" b="1" i="1" dirty="0">
+                <a:effectLst/>
+                <a:latin typeface="UT Sans"/>
+                <a:ea typeface="Calibri" panose="020F0502020204030204" pitchFamily="34" charset="0"/>
+                <a:cs typeface="Times New Roman" panose="02020603050405020304" pitchFamily="18" charset="0"/>
+              </a:rPr>
+              <a:t>or</a:t>
+            </a:r>
+            <a:r>
+              <a:rPr lang="en-US" sz="2000" b="1" i="1" dirty="0">
+                <a:effectLst/>
+                <a:latin typeface="UT Sans"/>
+                <a:ea typeface="Calibri" panose="020F0502020204030204" pitchFamily="34" charset="0"/>
+                <a:cs typeface="Times New Roman" panose="02020603050405020304" pitchFamily="18" charset="0"/>
+              </a:rPr>
+              <a:t>it</a:t>
             </a:r>
             <a:r>
               <a:rPr lang="en-US" sz="2000" dirty="0">

</xml_diff>